<commit_message>
Update image procressing pipeline
Updated for current analysis M-file:  mri_fitps.m.
</commit_message>
<xml_diff>
--- a/PTOA_ImageAnalysisPipeline.pptx
+++ b/PTOA_ImageAnalysisPipeline.pptx
@@ -228,7 +228,7 @@
           <a:p>
             <a:fld id="{FC708371-2EE1-4AD5-8AAD-1B917E870976}" type="datetimeFigureOut">
               <a:rPr lang="en-US" smtClean="0"/>
-              <a:t>2/21/2023</a:t>
+              <a:t>7/5/2023</a:t>
             </a:fld>
             <a:endParaRPr lang="en-US"/>
           </a:p>
@@ -710,7 +710,7 @@
           <a:p>
             <a:fld id="{6B46607B-1A35-499A-9B28-C398566005CC}" type="datetimeFigureOut">
               <a:rPr lang="en-US" smtClean="0"/>
-              <a:t>2/21/2023</a:t>
+              <a:t>7/5/2023</a:t>
             </a:fld>
             <a:endParaRPr lang="en-US"/>
           </a:p>
@@ -880,7 +880,7 @@
           <a:p>
             <a:fld id="{6B46607B-1A35-499A-9B28-C398566005CC}" type="datetimeFigureOut">
               <a:rPr lang="en-US" smtClean="0"/>
-              <a:t>2/21/2023</a:t>
+              <a:t>7/5/2023</a:t>
             </a:fld>
             <a:endParaRPr lang="en-US"/>
           </a:p>
@@ -1060,7 +1060,7 @@
           <a:p>
             <a:fld id="{6B46607B-1A35-499A-9B28-C398566005CC}" type="datetimeFigureOut">
               <a:rPr lang="en-US" smtClean="0"/>
-              <a:t>2/21/2023</a:t>
+              <a:t>7/5/2023</a:t>
             </a:fld>
             <a:endParaRPr lang="en-US"/>
           </a:p>
@@ -1230,7 +1230,7 @@
           <a:p>
             <a:fld id="{6B46607B-1A35-499A-9B28-C398566005CC}" type="datetimeFigureOut">
               <a:rPr lang="en-US" smtClean="0"/>
-              <a:t>2/21/2023</a:t>
+              <a:t>7/5/2023</a:t>
             </a:fld>
             <a:endParaRPr lang="en-US"/>
           </a:p>
@@ -1474,7 +1474,7 @@
           <a:p>
             <a:fld id="{6B46607B-1A35-499A-9B28-C398566005CC}" type="datetimeFigureOut">
               <a:rPr lang="en-US" smtClean="0"/>
-              <a:t>2/21/2023</a:t>
+              <a:t>7/5/2023</a:t>
             </a:fld>
             <a:endParaRPr lang="en-US"/>
           </a:p>
@@ -1706,7 +1706,7 @@
           <a:p>
             <a:fld id="{6B46607B-1A35-499A-9B28-C398566005CC}" type="datetimeFigureOut">
               <a:rPr lang="en-US" smtClean="0"/>
-              <a:t>2/21/2023</a:t>
+              <a:t>7/5/2023</a:t>
             </a:fld>
             <a:endParaRPr lang="en-US"/>
           </a:p>
@@ -2073,7 +2073,7 @@
           <a:p>
             <a:fld id="{6B46607B-1A35-499A-9B28-C398566005CC}" type="datetimeFigureOut">
               <a:rPr lang="en-US" smtClean="0"/>
-              <a:t>2/21/2023</a:t>
+              <a:t>7/5/2023</a:t>
             </a:fld>
             <a:endParaRPr lang="en-US"/>
           </a:p>
@@ -2191,7 +2191,7 @@
           <a:p>
             <a:fld id="{6B46607B-1A35-499A-9B28-C398566005CC}" type="datetimeFigureOut">
               <a:rPr lang="en-US" smtClean="0"/>
-              <a:t>2/21/2023</a:t>
+              <a:t>7/5/2023</a:t>
             </a:fld>
             <a:endParaRPr lang="en-US"/>
           </a:p>
@@ -2286,7 +2286,7 @@
           <a:p>
             <a:fld id="{6B46607B-1A35-499A-9B28-C398566005CC}" type="datetimeFigureOut">
               <a:rPr lang="en-US" smtClean="0"/>
-              <a:t>2/21/2023</a:t>
+              <a:t>7/5/2023</a:t>
             </a:fld>
             <a:endParaRPr lang="en-US"/>
           </a:p>
@@ -2563,7 +2563,7 @@
           <a:p>
             <a:fld id="{6B46607B-1A35-499A-9B28-C398566005CC}" type="datetimeFigureOut">
               <a:rPr lang="en-US" smtClean="0"/>
-              <a:t>2/21/2023</a:t>
+              <a:t>7/5/2023</a:t>
             </a:fld>
             <a:endParaRPr lang="en-US"/>
           </a:p>
@@ -2820,7 +2820,7 @@
           <a:p>
             <a:fld id="{6B46607B-1A35-499A-9B28-C398566005CC}" type="datetimeFigureOut">
               <a:rPr lang="en-US" smtClean="0"/>
-              <a:t>2/21/2023</a:t>
+              <a:t>7/5/2023</a:t>
             </a:fld>
             <a:endParaRPr lang="en-US"/>
           </a:p>
@@ -3033,7 +3033,7 @@
           <a:p>
             <a:fld id="{6B46607B-1A35-499A-9B28-C398566005CC}" type="datetimeFigureOut">
               <a:rPr lang="en-US" smtClean="0"/>
-              <a:t>2/21/2023</a:t>
+              <a:t>7/5/2023</a:t>
             </a:fld>
             <a:endParaRPr lang="en-US"/>
           </a:p>
@@ -4734,7 +4734,7 @@
             </a:r>
             <a:r>
               <a:rPr lang="en-US" sz="1200" i="1" dirty="0" err="1"/>
-              <a:t>mri_fitp.m</a:t>
+              <a:t>mri_fitps.m</a:t>
             </a:r>
             <a:endParaRPr lang="en-US" sz="1200" i="1" dirty="0"/>
           </a:p>
@@ -4795,7 +4795,7 @@
           <a:p>
             <a:r>
               <a:rPr lang="en-US" sz="1200" dirty="0" err="1"/>
-              <a:t>mri_fitp</a:t>
+              <a:t>mri_fitps</a:t>
             </a:r>
             <a:r>
               <a:rPr lang="en-US" sz="1200" dirty="0"/>
@@ -4907,7 +4907,7 @@
           <a:p>
             <a:r>
               <a:rPr lang="en-US" sz="1200" dirty="0"/>
-              <a:t>mri_fitp.xlsx</a:t>
+              <a:t>mri_fitps.xlsx</a:t>
             </a:r>
           </a:p>
           <a:p>
@@ -5049,7 +5049,19 @@
           <a:p>
             <a:r>
               <a:rPr lang="en-US" sz="1200" dirty="0" err="1"/>
-              <a:t>mri_fitp.mat</a:t>
+              <a:t>mri</a:t>
+            </a:r>
+            <a:r>
+              <a:rPr lang="en-US" sz="1200" err="1"/>
+              <a:t>_</a:t>
+            </a:r>
+            <a:r>
+              <a:rPr lang="en-US" sz="1200"/>
+              <a:t>fitps.</a:t>
+            </a:r>
+            <a:r>
+              <a:rPr lang="en-US" sz="1200" dirty="0" err="1"/>
+              <a:t>mat</a:t>
             </a:r>
             <a:endParaRPr lang="en-US" sz="1200" dirty="0"/>
           </a:p>

</xml_diff>

<commit_message>
Updates to image processing pipeline
Renumbered steps.
</commit_message>
<xml_diff>
--- a/PTOA_ImageAnalysisPipeline.pptx
+++ b/PTOA_ImageAnalysisPipeline.pptx
@@ -228,7 +228,7 @@
           <a:p>
             <a:fld id="{FC708371-2EE1-4AD5-8AAD-1B917E870976}" type="datetimeFigureOut">
               <a:rPr lang="en-US" smtClean="0"/>
-              <a:t>7/5/2023</a:t>
+              <a:t>7/7/2023</a:t>
             </a:fld>
             <a:endParaRPr lang="en-US"/>
           </a:p>
@@ -710,7 +710,7 @@
           <a:p>
             <a:fld id="{6B46607B-1A35-499A-9B28-C398566005CC}" type="datetimeFigureOut">
               <a:rPr lang="en-US" smtClean="0"/>
-              <a:t>7/5/2023</a:t>
+              <a:t>7/7/2023</a:t>
             </a:fld>
             <a:endParaRPr lang="en-US"/>
           </a:p>
@@ -880,7 +880,7 @@
           <a:p>
             <a:fld id="{6B46607B-1A35-499A-9B28-C398566005CC}" type="datetimeFigureOut">
               <a:rPr lang="en-US" smtClean="0"/>
-              <a:t>7/5/2023</a:t>
+              <a:t>7/7/2023</a:t>
             </a:fld>
             <a:endParaRPr lang="en-US"/>
           </a:p>
@@ -1060,7 +1060,7 @@
           <a:p>
             <a:fld id="{6B46607B-1A35-499A-9B28-C398566005CC}" type="datetimeFigureOut">
               <a:rPr lang="en-US" smtClean="0"/>
-              <a:t>7/5/2023</a:t>
+              <a:t>7/7/2023</a:t>
             </a:fld>
             <a:endParaRPr lang="en-US"/>
           </a:p>
@@ -1230,7 +1230,7 @@
           <a:p>
             <a:fld id="{6B46607B-1A35-499A-9B28-C398566005CC}" type="datetimeFigureOut">
               <a:rPr lang="en-US" smtClean="0"/>
-              <a:t>7/5/2023</a:t>
+              <a:t>7/7/2023</a:t>
             </a:fld>
             <a:endParaRPr lang="en-US"/>
           </a:p>
@@ -1474,7 +1474,7 @@
           <a:p>
             <a:fld id="{6B46607B-1A35-499A-9B28-C398566005CC}" type="datetimeFigureOut">
               <a:rPr lang="en-US" smtClean="0"/>
-              <a:t>7/5/2023</a:t>
+              <a:t>7/7/2023</a:t>
             </a:fld>
             <a:endParaRPr lang="en-US"/>
           </a:p>
@@ -1706,7 +1706,7 @@
           <a:p>
             <a:fld id="{6B46607B-1A35-499A-9B28-C398566005CC}" type="datetimeFigureOut">
               <a:rPr lang="en-US" smtClean="0"/>
-              <a:t>7/5/2023</a:t>
+              <a:t>7/7/2023</a:t>
             </a:fld>
             <a:endParaRPr lang="en-US"/>
           </a:p>
@@ -2073,7 +2073,7 @@
           <a:p>
             <a:fld id="{6B46607B-1A35-499A-9B28-C398566005CC}" type="datetimeFigureOut">
               <a:rPr lang="en-US" smtClean="0"/>
-              <a:t>7/5/2023</a:t>
+              <a:t>7/7/2023</a:t>
             </a:fld>
             <a:endParaRPr lang="en-US"/>
           </a:p>
@@ -2191,7 +2191,7 @@
           <a:p>
             <a:fld id="{6B46607B-1A35-499A-9B28-C398566005CC}" type="datetimeFigureOut">
               <a:rPr lang="en-US" smtClean="0"/>
-              <a:t>7/5/2023</a:t>
+              <a:t>7/7/2023</a:t>
             </a:fld>
             <a:endParaRPr lang="en-US"/>
           </a:p>
@@ -2286,7 +2286,7 @@
           <a:p>
             <a:fld id="{6B46607B-1A35-499A-9B28-C398566005CC}" type="datetimeFigureOut">
               <a:rPr lang="en-US" smtClean="0"/>
-              <a:t>7/5/2023</a:t>
+              <a:t>7/7/2023</a:t>
             </a:fld>
             <a:endParaRPr lang="en-US"/>
           </a:p>
@@ -2563,7 +2563,7 @@
           <a:p>
             <a:fld id="{6B46607B-1A35-499A-9B28-C398566005CC}" type="datetimeFigureOut">
               <a:rPr lang="en-US" smtClean="0"/>
-              <a:t>7/5/2023</a:t>
+              <a:t>7/7/2023</a:t>
             </a:fld>
             <a:endParaRPr lang="en-US"/>
           </a:p>
@@ -2820,7 +2820,7 @@
           <a:p>
             <a:fld id="{6B46607B-1A35-499A-9B28-C398566005CC}" type="datetimeFigureOut">
               <a:rPr lang="en-US" smtClean="0"/>
-              <a:t>7/5/2023</a:t>
+              <a:t>7/7/2023</a:t>
             </a:fld>
             <a:endParaRPr lang="en-US"/>
           </a:p>
@@ -3033,7 +3033,7 @@
           <a:p>
             <a:fld id="{6B46607B-1A35-499A-9B28-C398566005CC}" type="datetimeFigureOut">
               <a:rPr lang="en-US" smtClean="0"/>
-              <a:t>7/5/2023</a:t>
+              <a:t>7/7/2023</a:t>
             </a:fld>
             <a:endParaRPr lang="en-US"/>
           </a:p>
@@ -4323,7 +4323,7 @@
             <a:pPr algn="ctr"/>
             <a:r>
               <a:rPr lang="en-US" sz="1200" b="1" u="sng" dirty="0"/>
-              <a:t>9.</a:t>
+              <a:t>4.</a:t>
             </a:r>
             <a:r>
               <a:rPr lang="en-US" sz="1200" dirty="0"/>
@@ -4725,11 +4725,11 @@
           <a:p>
             <a:pPr algn="ctr"/>
             <a:r>
-              <a:rPr lang="en-US" sz="1200" b="1" u="sng" dirty="0"/>
-              <a:t>10.</a:t>
-            </a:r>
-            <a:r>
-              <a:rPr lang="en-US" sz="1200" dirty="0"/>
+              <a:rPr lang="en-US" sz="1200" b="1" u="sng"/>
+              <a:t>5.</a:t>
+            </a:r>
+            <a:r>
+              <a:rPr lang="en-US" sz="1200"/>
               <a:t> </a:t>
             </a:r>
             <a:r>

</xml_diff>